<commit_message>
Updates on con1 con2
Needs to finish con3
</commit_message>
<xml_diff>
--- a/Slides/drawings.pptx
+++ b/Slides/drawings.pptx
@@ -290,7 +290,7 @@
             <a:fld id="{1D8BD707-D9CF-40AE-B4C6-C98DA3205C09}" type="datetimeFigureOut">
               <a:rPr lang="en-US" smtClean="0"/>
               <a:pPr/>
-              <a:t>7/25/2016</a:t>
+              <a:t>8/3/2016</a:t>
             </a:fld>
             <a:endParaRPr lang="en-US"/>
           </a:p>
@@ -457,7 +457,7 @@
             <a:fld id="{1D8BD707-D9CF-40AE-B4C6-C98DA3205C09}" type="datetimeFigureOut">
               <a:rPr lang="en-US" smtClean="0"/>
               <a:pPr/>
-              <a:t>7/25/2016</a:t>
+              <a:t>8/3/2016</a:t>
             </a:fld>
             <a:endParaRPr lang="en-US"/>
           </a:p>
@@ -634,7 +634,7 @@
             <a:fld id="{1D8BD707-D9CF-40AE-B4C6-C98DA3205C09}" type="datetimeFigureOut">
               <a:rPr lang="en-US" smtClean="0"/>
               <a:pPr/>
-              <a:t>7/25/2016</a:t>
+              <a:t>8/3/2016</a:t>
             </a:fld>
             <a:endParaRPr lang="en-US"/>
           </a:p>
@@ -801,7 +801,7 @@
             <a:fld id="{1D8BD707-D9CF-40AE-B4C6-C98DA3205C09}" type="datetimeFigureOut">
               <a:rPr lang="en-US" smtClean="0"/>
               <a:pPr/>
-              <a:t>7/25/2016</a:t>
+              <a:t>8/3/2016</a:t>
             </a:fld>
             <a:endParaRPr lang="en-US"/>
           </a:p>
@@ -1044,7 +1044,7 @@
             <a:fld id="{1D8BD707-D9CF-40AE-B4C6-C98DA3205C09}" type="datetimeFigureOut">
               <a:rPr lang="en-US" smtClean="0"/>
               <a:pPr/>
-              <a:t>7/25/2016</a:t>
+              <a:t>8/3/2016</a:t>
             </a:fld>
             <a:endParaRPr lang="en-US"/>
           </a:p>
@@ -1329,7 +1329,7 @@
             <a:fld id="{1D8BD707-D9CF-40AE-B4C6-C98DA3205C09}" type="datetimeFigureOut">
               <a:rPr lang="en-US" smtClean="0"/>
               <a:pPr/>
-              <a:t>7/25/2016</a:t>
+              <a:t>8/3/2016</a:t>
             </a:fld>
             <a:endParaRPr lang="en-US"/>
           </a:p>
@@ -1748,7 +1748,7 @@
             <a:fld id="{1D8BD707-D9CF-40AE-B4C6-C98DA3205C09}" type="datetimeFigureOut">
               <a:rPr lang="en-US" smtClean="0"/>
               <a:pPr/>
-              <a:t>7/25/2016</a:t>
+              <a:t>8/3/2016</a:t>
             </a:fld>
             <a:endParaRPr lang="en-US"/>
           </a:p>
@@ -1863,7 +1863,7 @@
             <a:fld id="{1D8BD707-D9CF-40AE-B4C6-C98DA3205C09}" type="datetimeFigureOut">
               <a:rPr lang="en-US" smtClean="0"/>
               <a:pPr/>
-              <a:t>7/25/2016</a:t>
+              <a:t>8/3/2016</a:t>
             </a:fld>
             <a:endParaRPr lang="en-US"/>
           </a:p>
@@ -1955,7 +1955,7 @@
             <a:fld id="{1D8BD707-D9CF-40AE-B4C6-C98DA3205C09}" type="datetimeFigureOut">
               <a:rPr lang="en-US" smtClean="0"/>
               <a:pPr/>
-              <a:t>7/25/2016</a:t>
+              <a:t>8/3/2016</a:t>
             </a:fld>
             <a:endParaRPr lang="en-US"/>
           </a:p>
@@ -2229,7 +2229,7 @@
             <a:fld id="{1D8BD707-D9CF-40AE-B4C6-C98DA3205C09}" type="datetimeFigureOut">
               <a:rPr lang="en-US" smtClean="0"/>
               <a:pPr/>
-              <a:t>7/25/2016</a:t>
+              <a:t>8/3/2016</a:t>
             </a:fld>
             <a:endParaRPr lang="en-US"/>
           </a:p>
@@ -2479,7 +2479,7 @@
             <a:fld id="{1D8BD707-D9CF-40AE-B4C6-C98DA3205C09}" type="datetimeFigureOut">
               <a:rPr lang="en-US" smtClean="0"/>
               <a:pPr/>
-              <a:t>7/25/2016</a:t>
+              <a:t>8/3/2016</a:t>
             </a:fld>
             <a:endParaRPr lang="en-US"/>
           </a:p>
@@ -2689,7 +2689,7 @@
             <a:fld id="{1D8BD707-D9CF-40AE-B4C6-C98DA3205C09}" type="datetimeFigureOut">
               <a:rPr lang="en-US" smtClean="0"/>
               <a:pPr/>
-              <a:t>7/25/2016</a:t>
+              <a:t>8/3/2016</a:t>
             </a:fld>
             <a:endParaRPr lang="en-US"/>
           </a:p>
@@ -6679,7 +6679,15 @@
                   <a:schemeClr val="dk1"/>
                 </a:solidFill>
               </a:rPr>
-              <a:t>Graph: Graph Window Analytics</a:t>
+              <a:t>Graph: Graph Window </a:t>
+            </a:r>
+            <a:r>
+              <a:rPr lang="en-US" sz="2000" dirty="0" smtClean="0">
+                <a:solidFill>
+                  <a:schemeClr val="dk1"/>
+                </a:solidFill>
+              </a:rPr>
+              <a:t>Queries</a:t>
             </a:r>
             <a:endParaRPr lang="en-US" sz="2000" dirty="0">
               <a:solidFill>
@@ -6728,15 +6736,7 @@
                   <a:schemeClr val="dk1"/>
                 </a:solidFill>
               </a:rPr>
-              <a:t>Time Series: Rank-aware </a:t>
-            </a:r>
-            <a:r>
-              <a:rPr lang="en-US" sz="2000" dirty="0" smtClean="0">
-                <a:solidFill>
-                  <a:schemeClr val="dk1"/>
-                </a:solidFill>
-              </a:rPr>
-              <a:t>Streak Discovery</a:t>
+              <a:t>Sequence data: k-Sketch Query</a:t>
             </a:r>
             <a:endParaRPr lang="en-US" sz="2000" dirty="0">
               <a:solidFill>
@@ -6793,7 +6793,11 @@
             </a:r>
             <a:r>
               <a:rPr lang="en-US" sz="2000" dirty="0" smtClean="0"/>
-              <a:t>Movement Pattern </a:t>
+              <a:t>Co-Movement </a:t>
+            </a:r>
+            <a:r>
+              <a:rPr lang="en-US" sz="2000" dirty="0" smtClean="0"/>
+              <a:t>Pattern </a:t>
             </a:r>
             <a:r>
               <a:rPr lang="en-US" sz="2000" dirty="0" smtClean="0">
@@ -6801,7 +6805,7 @@
                   <a:schemeClr val="dk1"/>
                 </a:solidFill>
               </a:rPr>
-              <a:t>Mining</a:t>
+              <a:t>Query</a:t>
             </a:r>
             <a:endParaRPr lang="en-US" sz="2000" dirty="0">
               <a:solidFill>

</xml_diff>